<commit_message>
big data dan cloud computing
</commit_message>
<xml_diff>
--- a/6. Pengantar e-Commerce dan e-Businees.pptx
+++ b/6. Pengantar e-Commerce dan e-Businees.pptx
@@ -109,6 +109,11 @@
       </a:defRPr>
     </a:lvl9pPr>
   </p:defaultTextStyle>
+  <p:extLst>
+    <p:ext uri="{EFAFB233-063F-42B5-8137-9DF3F51BA10A}">
+      <p15:sldGuideLst xmlns:p15="http://schemas.microsoft.com/office/powerpoint/2012/main"/>
+    </p:ext>
+  </p:extLst>
 </p:presentation>
 </file>
 
@@ -259,7 +264,7 @@
           <a:p>
             <a:fld id="{1A5AD81B-B79C-7340-B618-F2CA5EF0AFE6}" type="datetimeFigureOut">
               <a:rPr lang="en-US" smtClean="0"/>
-              <a:t>10/7/24</a:t>
+              <a:t>11/8/24</a:t>
             </a:fld>
             <a:endParaRPr lang="en-US"/>
           </a:p>
@@ -457,7 +462,7 @@
           <a:p>
             <a:fld id="{1A5AD81B-B79C-7340-B618-F2CA5EF0AFE6}" type="datetimeFigureOut">
               <a:rPr lang="en-US" smtClean="0"/>
-              <a:t>10/7/24</a:t>
+              <a:t>11/8/24</a:t>
             </a:fld>
             <a:endParaRPr lang="en-US"/>
           </a:p>
@@ -665,7 +670,7 @@
           <a:p>
             <a:fld id="{1A5AD81B-B79C-7340-B618-F2CA5EF0AFE6}" type="datetimeFigureOut">
               <a:rPr lang="en-US" smtClean="0"/>
-              <a:t>10/7/24</a:t>
+              <a:t>11/8/24</a:t>
             </a:fld>
             <a:endParaRPr lang="en-US"/>
           </a:p>
@@ -863,7 +868,7 @@
           <a:p>
             <a:fld id="{1A5AD81B-B79C-7340-B618-F2CA5EF0AFE6}" type="datetimeFigureOut">
               <a:rPr lang="en-US" smtClean="0"/>
-              <a:t>10/7/24</a:t>
+              <a:t>11/8/24</a:t>
             </a:fld>
             <a:endParaRPr lang="en-US"/>
           </a:p>
@@ -1138,7 +1143,7 @@
           <a:p>
             <a:fld id="{1A5AD81B-B79C-7340-B618-F2CA5EF0AFE6}" type="datetimeFigureOut">
               <a:rPr lang="en-US" smtClean="0"/>
-              <a:t>10/7/24</a:t>
+              <a:t>11/8/24</a:t>
             </a:fld>
             <a:endParaRPr lang="en-US"/>
           </a:p>
@@ -1403,7 +1408,7 @@
           <a:p>
             <a:fld id="{1A5AD81B-B79C-7340-B618-F2CA5EF0AFE6}" type="datetimeFigureOut">
               <a:rPr lang="en-US" smtClean="0"/>
-              <a:t>10/7/24</a:t>
+              <a:t>11/8/24</a:t>
             </a:fld>
             <a:endParaRPr lang="en-US"/>
           </a:p>
@@ -1815,7 +1820,7 @@
           <a:p>
             <a:fld id="{1A5AD81B-B79C-7340-B618-F2CA5EF0AFE6}" type="datetimeFigureOut">
               <a:rPr lang="en-US" smtClean="0"/>
-              <a:t>10/7/24</a:t>
+              <a:t>11/8/24</a:t>
             </a:fld>
             <a:endParaRPr lang="en-US"/>
           </a:p>
@@ -1956,7 +1961,7 @@
           <a:p>
             <a:fld id="{1A5AD81B-B79C-7340-B618-F2CA5EF0AFE6}" type="datetimeFigureOut">
               <a:rPr lang="en-US" smtClean="0"/>
-              <a:t>10/7/24</a:t>
+              <a:t>11/8/24</a:t>
             </a:fld>
             <a:endParaRPr lang="en-US"/>
           </a:p>
@@ -2069,7 +2074,7 @@
           <a:p>
             <a:fld id="{1A5AD81B-B79C-7340-B618-F2CA5EF0AFE6}" type="datetimeFigureOut">
               <a:rPr lang="en-US" smtClean="0"/>
-              <a:t>10/7/24</a:t>
+              <a:t>11/8/24</a:t>
             </a:fld>
             <a:endParaRPr lang="en-US"/>
           </a:p>
@@ -2380,7 +2385,7 @@
           <a:p>
             <a:fld id="{1A5AD81B-B79C-7340-B618-F2CA5EF0AFE6}" type="datetimeFigureOut">
               <a:rPr lang="en-US" smtClean="0"/>
-              <a:t>10/7/24</a:t>
+              <a:t>11/8/24</a:t>
             </a:fld>
             <a:endParaRPr lang="en-US"/>
           </a:p>
@@ -2668,7 +2673,7 @@
           <a:p>
             <a:fld id="{1A5AD81B-B79C-7340-B618-F2CA5EF0AFE6}" type="datetimeFigureOut">
               <a:rPr lang="en-US" smtClean="0"/>
-              <a:t>10/7/24</a:t>
+              <a:t>11/8/24</a:t>
             </a:fld>
             <a:endParaRPr lang="en-US"/>
           </a:p>
@@ -2909,7 +2914,7 @@
           <a:p>
             <a:fld id="{1A5AD81B-B79C-7340-B618-F2CA5EF0AFE6}" type="datetimeFigureOut">
               <a:rPr lang="en-US" smtClean="0"/>
-              <a:t>10/7/24</a:t>
+              <a:t>11/8/24</a:t>
             </a:fld>
             <a:endParaRPr lang="en-US"/>
           </a:p>

</xml_diff>